<commit_message>
Created a basic first version of the application with totactoe challenge
</commit_message>
<xml_diff>
--- a/docs/hackyOWL.pptx
+++ b/docs/hackyOWL.pptx
@@ -259,7 +259,7 @@
           <a:p>
             <a:fld id="{F082AF23-E69D-451E-BD7B-3525F6B6708C}" type="datetimeFigureOut">
               <a:rPr lang="en-US" smtClean="0"/>
-              <a:t>2/21/2023</a:t>
+              <a:t>2/26/2023</a:t>
             </a:fld>
             <a:endParaRPr lang="en-US"/>
           </a:p>
@@ -457,7 +457,7 @@
           <a:p>
             <a:fld id="{F082AF23-E69D-451E-BD7B-3525F6B6708C}" type="datetimeFigureOut">
               <a:rPr lang="en-US" smtClean="0"/>
-              <a:t>2/21/2023</a:t>
+              <a:t>2/26/2023</a:t>
             </a:fld>
             <a:endParaRPr lang="en-US"/>
           </a:p>
@@ -665,7 +665,7 @@
           <a:p>
             <a:fld id="{F082AF23-E69D-451E-BD7B-3525F6B6708C}" type="datetimeFigureOut">
               <a:rPr lang="en-US" smtClean="0"/>
-              <a:t>2/21/2023</a:t>
+              <a:t>2/26/2023</a:t>
             </a:fld>
             <a:endParaRPr lang="en-US"/>
           </a:p>
@@ -863,7 +863,7 @@
           <a:p>
             <a:fld id="{F082AF23-E69D-451E-BD7B-3525F6B6708C}" type="datetimeFigureOut">
               <a:rPr lang="en-US" smtClean="0"/>
-              <a:t>2/21/2023</a:t>
+              <a:t>2/26/2023</a:t>
             </a:fld>
             <a:endParaRPr lang="en-US"/>
           </a:p>
@@ -1138,7 +1138,7 @@
           <a:p>
             <a:fld id="{F082AF23-E69D-451E-BD7B-3525F6B6708C}" type="datetimeFigureOut">
               <a:rPr lang="en-US" smtClean="0"/>
-              <a:t>2/21/2023</a:t>
+              <a:t>2/26/2023</a:t>
             </a:fld>
             <a:endParaRPr lang="en-US"/>
           </a:p>
@@ -1403,7 +1403,7 @@
           <a:p>
             <a:fld id="{F082AF23-E69D-451E-BD7B-3525F6B6708C}" type="datetimeFigureOut">
               <a:rPr lang="en-US" smtClean="0"/>
-              <a:t>2/21/2023</a:t>
+              <a:t>2/26/2023</a:t>
             </a:fld>
             <a:endParaRPr lang="en-US"/>
           </a:p>
@@ -1815,7 +1815,7 @@
           <a:p>
             <a:fld id="{F082AF23-E69D-451E-BD7B-3525F6B6708C}" type="datetimeFigureOut">
               <a:rPr lang="en-US" smtClean="0"/>
-              <a:t>2/21/2023</a:t>
+              <a:t>2/26/2023</a:t>
             </a:fld>
             <a:endParaRPr lang="en-US"/>
           </a:p>
@@ -1956,7 +1956,7 @@
           <a:p>
             <a:fld id="{F082AF23-E69D-451E-BD7B-3525F6B6708C}" type="datetimeFigureOut">
               <a:rPr lang="en-US" smtClean="0"/>
-              <a:t>2/21/2023</a:t>
+              <a:t>2/26/2023</a:t>
             </a:fld>
             <a:endParaRPr lang="en-US"/>
           </a:p>
@@ -2069,7 +2069,7 @@
           <a:p>
             <a:fld id="{F082AF23-E69D-451E-BD7B-3525F6B6708C}" type="datetimeFigureOut">
               <a:rPr lang="en-US" smtClean="0"/>
-              <a:t>2/21/2023</a:t>
+              <a:t>2/26/2023</a:t>
             </a:fld>
             <a:endParaRPr lang="en-US"/>
           </a:p>
@@ -2380,7 +2380,7 @@
           <a:p>
             <a:fld id="{F082AF23-E69D-451E-BD7B-3525F6B6708C}" type="datetimeFigureOut">
               <a:rPr lang="en-US" smtClean="0"/>
-              <a:t>2/21/2023</a:t>
+              <a:t>2/26/2023</a:t>
             </a:fld>
             <a:endParaRPr lang="en-US"/>
           </a:p>
@@ -2668,7 +2668,7 @@
           <a:p>
             <a:fld id="{F082AF23-E69D-451E-BD7B-3525F6B6708C}" type="datetimeFigureOut">
               <a:rPr lang="en-US" smtClean="0"/>
-              <a:t>2/21/2023</a:t>
+              <a:t>2/26/2023</a:t>
             </a:fld>
             <a:endParaRPr lang="en-US"/>
           </a:p>
@@ -2909,7 +2909,7 @@
           <a:p>
             <a:fld id="{F082AF23-E69D-451E-BD7B-3525F6B6708C}" type="datetimeFigureOut">
               <a:rPr lang="en-US" smtClean="0"/>
-              <a:t>2/21/2023</a:t>
+              <a:t>2/26/2023</a:t>
             </a:fld>
             <a:endParaRPr lang="en-US"/>
           </a:p>
@@ -3443,6 +3443,123 @@
           </a:prstGeom>
         </p:spPr>
       </p:pic>
+      <p:pic>
+        <p:nvPicPr>
+          <p:cNvPr id="6" name="Graphic 5" descr="Owl with solid fill">
+            <a:extLst>
+              <a:ext uri="{FF2B5EF4-FFF2-40B4-BE49-F238E27FC236}">
+                <a16:creationId xmlns:a16="http://schemas.microsoft.com/office/drawing/2014/main" id="{9A81EC24-696A-E7D3-1D7E-B49F9C4B8FC2}"/>
+              </a:ext>
+            </a:extLst>
+          </p:cNvPr>
+          <p:cNvPicPr>
+            <a:picLocks noChangeAspect="1"/>
+          </p:cNvPicPr>
+          <p:nvPr/>
+        </p:nvPicPr>
+        <p:blipFill>
+          <a:blip r:embed="rId8">
+            <a:extLst>
+              <a:ext uri="{28A0092B-C50C-407E-A947-70E740481C1C}">
+                <a14:useLocalDpi xmlns:a14="http://schemas.microsoft.com/office/drawing/2010/main" val="0"/>
+              </a:ext>
+              <a:ext uri="{96DAC541-7B7A-43D3-8B79-37D633B846F1}">
+                <asvg:svgBlip xmlns:asvg="http://schemas.microsoft.com/office/drawing/2016/SVG/main" r:embed="rId9"/>
+              </a:ext>
+            </a:extLst>
+          </a:blip>
+          <a:stretch>
+            <a:fillRect/>
+          </a:stretch>
+        </p:blipFill>
+        <p:spPr>
+          <a:xfrm>
+            <a:off x="3057306" y="3564206"/>
+            <a:ext cx="914400" cy="914400"/>
+          </a:xfrm>
+          <a:prstGeom prst="rect">
+            <a:avLst/>
+          </a:prstGeom>
+        </p:spPr>
+      </p:pic>
+      <p:pic>
+        <p:nvPicPr>
+          <p:cNvPr id="8" name="Graphic 7" descr="Owl outline">
+            <a:extLst>
+              <a:ext uri="{FF2B5EF4-FFF2-40B4-BE49-F238E27FC236}">
+                <a16:creationId xmlns:a16="http://schemas.microsoft.com/office/drawing/2014/main" id="{9414256E-6F0F-D3FA-5ADD-5FC3AB29038F}"/>
+              </a:ext>
+            </a:extLst>
+          </p:cNvPr>
+          <p:cNvPicPr>
+            <a:picLocks noChangeAspect="1"/>
+          </p:cNvPicPr>
+          <p:nvPr/>
+        </p:nvPicPr>
+        <p:blipFill>
+          <a:blip r:embed="rId10">
+            <a:extLst>
+              <a:ext uri="{28A0092B-C50C-407E-A947-70E740481C1C}">
+                <a14:useLocalDpi xmlns:a14="http://schemas.microsoft.com/office/drawing/2010/main" val="0"/>
+              </a:ext>
+              <a:ext uri="{96DAC541-7B7A-43D3-8B79-37D633B846F1}">
+                <asvg:svgBlip xmlns:asvg="http://schemas.microsoft.com/office/drawing/2016/SVG/main" r:embed="rId11"/>
+              </a:ext>
+            </a:extLst>
+          </a:blip>
+          <a:stretch>
+            <a:fillRect/>
+          </a:stretch>
+        </p:blipFill>
+        <p:spPr>
+          <a:xfrm>
+            <a:off x="5574491" y="3564206"/>
+            <a:ext cx="914400" cy="914400"/>
+          </a:xfrm>
+          <a:prstGeom prst="rect">
+            <a:avLst/>
+          </a:prstGeom>
+        </p:spPr>
+      </p:pic>
+      <p:pic>
+        <p:nvPicPr>
+          <p:cNvPr id="10" name="Graphic 9" descr="Playbook outline">
+            <a:extLst>
+              <a:ext uri="{FF2B5EF4-FFF2-40B4-BE49-F238E27FC236}">
+                <a16:creationId xmlns:a16="http://schemas.microsoft.com/office/drawing/2014/main" id="{3873DCD9-0147-5968-E4B2-83385CABF20B}"/>
+              </a:ext>
+            </a:extLst>
+          </p:cNvPr>
+          <p:cNvPicPr>
+            <a:picLocks noChangeAspect="1"/>
+          </p:cNvPicPr>
+          <p:nvPr/>
+        </p:nvPicPr>
+        <p:blipFill>
+          <a:blip r:embed="rId12">
+            <a:extLst>
+              <a:ext uri="{28A0092B-C50C-407E-A947-70E740481C1C}">
+                <a14:useLocalDpi xmlns:a14="http://schemas.microsoft.com/office/drawing/2010/main" val="0"/>
+              </a:ext>
+              <a:ext uri="{96DAC541-7B7A-43D3-8B79-37D633B846F1}">
+                <asvg:svgBlip xmlns:asvg="http://schemas.microsoft.com/office/drawing/2016/SVG/main" r:embed="rId13"/>
+              </a:ext>
+            </a:extLst>
+          </a:blip>
+          <a:stretch>
+            <a:fillRect/>
+          </a:stretch>
+        </p:blipFill>
+        <p:spPr>
+          <a:xfrm>
+            <a:off x="5574491" y="5332096"/>
+            <a:ext cx="914400" cy="914400"/>
+          </a:xfrm>
+          <a:prstGeom prst="rect">
+            <a:avLst/>
+          </a:prstGeom>
+        </p:spPr>
+      </p:pic>
     </p:spTree>
     <p:extLst>
       <p:ext uri="{BB962C8B-B14F-4D97-AF65-F5344CB8AC3E}">

</xml_diff>

<commit_message>
- Created the Solution button - Implemented the Game Completed Status for the TicTacToe - Implemented Challenge List Screen with Gif images
</commit_message>
<xml_diff>
--- a/docs/hackyOWL.pptx
+++ b/docs/hackyOWL.pptx
@@ -259,7 +259,7 @@
           <a:p>
             <a:fld id="{F082AF23-E69D-451E-BD7B-3525F6B6708C}" type="datetimeFigureOut">
               <a:rPr lang="en-US" smtClean="0"/>
-              <a:t>2/26/2023</a:t>
+              <a:t>3/9/2023</a:t>
             </a:fld>
             <a:endParaRPr lang="en-US"/>
           </a:p>
@@ -457,7 +457,7 @@
           <a:p>
             <a:fld id="{F082AF23-E69D-451E-BD7B-3525F6B6708C}" type="datetimeFigureOut">
               <a:rPr lang="en-US" smtClean="0"/>
-              <a:t>2/26/2023</a:t>
+              <a:t>3/9/2023</a:t>
             </a:fld>
             <a:endParaRPr lang="en-US"/>
           </a:p>
@@ -665,7 +665,7 @@
           <a:p>
             <a:fld id="{F082AF23-E69D-451E-BD7B-3525F6B6708C}" type="datetimeFigureOut">
               <a:rPr lang="en-US" smtClean="0"/>
-              <a:t>2/26/2023</a:t>
+              <a:t>3/9/2023</a:t>
             </a:fld>
             <a:endParaRPr lang="en-US"/>
           </a:p>
@@ -863,7 +863,7 @@
           <a:p>
             <a:fld id="{F082AF23-E69D-451E-BD7B-3525F6B6708C}" type="datetimeFigureOut">
               <a:rPr lang="en-US" smtClean="0"/>
-              <a:t>2/26/2023</a:t>
+              <a:t>3/9/2023</a:t>
             </a:fld>
             <a:endParaRPr lang="en-US"/>
           </a:p>
@@ -1138,7 +1138,7 @@
           <a:p>
             <a:fld id="{F082AF23-E69D-451E-BD7B-3525F6B6708C}" type="datetimeFigureOut">
               <a:rPr lang="en-US" smtClean="0"/>
-              <a:t>2/26/2023</a:t>
+              <a:t>3/9/2023</a:t>
             </a:fld>
             <a:endParaRPr lang="en-US"/>
           </a:p>
@@ -1403,7 +1403,7 @@
           <a:p>
             <a:fld id="{F082AF23-E69D-451E-BD7B-3525F6B6708C}" type="datetimeFigureOut">
               <a:rPr lang="en-US" smtClean="0"/>
-              <a:t>2/26/2023</a:t>
+              <a:t>3/9/2023</a:t>
             </a:fld>
             <a:endParaRPr lang="en-US"/>
           </a:p>
@@ -1815,7 +1815,7 @@
           <a:p>
             <a:fld id="{F082AF23-E69D-451E-BD7B-3525F6B6708C}" type="datetimeFigureOut">
               <a:rPr lang="en-US" smtClean="0"/>
-              <a:t>2/26/2023</a:t>
+              <a:t>3/9/2023</a:t>
             </a:fld>
             <a:endParaRPr lang="en-US"/>
           </a:p>
@@ -1956,7 +1956,7 @@
           <a:p>
             <a:fld id="{F082AF23-E69D-451E-BD7B-3525F6B6708C}" type="datetimeFigureOut">
               <a:rPr lang="en-US" smtClean="0"/>
-              <a:t>2/26/2023</a:t>
+              <a:t>3/9/2023</a:t>
             </a:fld>
             <a:endParaRPr lang="en-US"/>
           </a:p>
@@ -2069,7 +2069,7 @@
           <a:p>
             <a:fld id="{F082AF23-E69D-451E-BD7B-3525F6B6708C}" type="datetimeFigureOut">
               <a:rPr lang="en-US" smtClean="0"/>
-              <a:t>2/26/2023</a:t>
+              <a:t>3/9/2023</a:t>
             </a:fld>
             <a:endParaRPr lang="en-US"/>
           </a:p>
@@ -2380,7 +2380,7 @@
           <a:p>
             <a:fld id="{F082AF23-E69D-451E-BD7B-3525F6B6708C}" type="datetimeFigureOut">
               <a:rPr lang="en-US" smtClean="0"/>
-              <a:t>2/26/2023</a:t>
+              <a:t>3/9/2023</a:t>
             </a:fld>
             <a:endParaRPr lang="en-US"/>
           </a:p>
@@ -2668,7 +2668,7 @@
           <a:p>
             <a:fld id="{F082AF23-E69D-451E-BD7B-3525F6B6708C}" type="datetimeFigureOut">
               <a:rPr lang="en-US" smtClean="0"/>
-              <a:t>2/26/2023</a:t>
+              <a:t>3/9/2023</a:t>
             </a:fld>
             <a:endParaRPr lang="en-US"/>
           </a:p>
@@ -2909,7 +2909,7 @@
           <a:p>
             <a:fld id="{F082AF23-E69D-451E-BD7B-3525F6B6708C}" type="datetimeFigureOut">
               <a:rPr lang="en-US" smtClean="0"/>
-              <a:t>2/26/2023</a:t>
+              <a:t>3/9/2023</a:t>
             </a:fld>
             <a:endParaRPr lang="en-US"/>
           </a:p>
@@ -3474,7 +3474,7 @@
         </p:blipFill>
         <p:spPr>
           <a:xfrm>
-            <a:off x="3057306" y="3564206"/>
+            <a:off x="1246711" y="3706953"/>
             <a:ext cx="914400" cy="914400"/>
           </a:xfrm>
           <a:prstGeom prst="rect">
@@ -3554,6 +3554,261 @@
           <a:xfrm>
             <a:off x="5574491" y="5332096"/>
             <a:ext cx="914400" cy="914400"/>
+          </a:xfrm>
+          <a:prstGeom prst="rect">
+            <a:avLst/>
+          </a:prstGeom>
+        </p:spPr>
+      </p:pic>
+      <p:pic>
+        <p:nvPicPr>
+          <p:cNvPr id="7" name="Graphic 6" descr="Customer review outline">
+            <a:extLst>
+              <a:ext uri="{FF2B5EF4-FFF2-40B4-BE49-F238E27FC236}">
+                <a16:creationId xmlns:a16="http://schemas.microsoft.com/office/drawing/2014/main" id="{4344917F-7A48-FD15-90C1-C19914C5FFBC}"/>
+              </a:ext>
+            </a:extLst>
+          </p:cNvPr>
+          <p:cNvPicPr>
+            <a:picLocks noChangeAspect="1"/>
+          </p:cNvPicPr>
+          <p:nvPr/>
+        </p:nvPicPr>
+        <p:blipFill>
+          <a:blip r:embed="rId14">
+            <a:extLst>
+              <a:ext uri="{28A0092B-C50C-407E-A947-70E740481C1C}">
+                <a14:useLocalDpi xmlns:a14="http://schemas.microsoft.com/office/drawing/2010/main" val="0"/>
+              </a:ext>
+              <a:ext uri="{96DAC541-7B7A-43D3-8B79-37D633B846F1}">
+                <asvg:svgBlip xmlns:asvg="http://schemas.microsoft.com/office/drawing/2016/SVG/main" r:embed="rId15"/>
+              </a:ext>
+            </a:extLst>
+          </a:blip>
+          <a:stretch>
+            <a:fillRect/>
+          </a:stretch>
+        </p:blipFill>
+        <p:spPr>
+          <a:xfrm>
+            <a:off x="8382000" y="2448660"/>
+            <a:ext cx="914400" cy="914400"/>
+          </a:xfrm>
+          <a:prstGeom prst="rect">
+            <a:avLst/>
+          </a:prstGeom>
+        </p:spPr>
+      </p:pic>
+      <p:pic>
+        <p:nvPicPr>
+          <p:cNvPr id="11" name="Graphic 10" descr="Questions outline">
+            <a:extLst>
+              <a:ext uri="{FF2B5EF4-FFF2-40B4-BE49-F238E27FC236}">
+                <a16:creationId xmlns:a16="http://schemas.microsoft.com/office/drawing/2014/main" id="{48A01F0E-4B7C-F8D5-ACA5-0981FA6B707B}"/>
+              </a:ext>
+            </a:extLst>
+          </p:cNvPr>
+          <p:cNvPicPr>
+            <a:picLocks noChangeAspect="1"/>
+          </p:cNvPicPr>
+          <p:nvPr/>
+        </p:nvPicPr>
+        <p:blipFill>
+          <a:blip r:embed="rId16">
+            <a:extLst>
+              <a:ext uri="{28A0092B-C50C-407E-A947-70E740481C1C}">
+                <a14:useLocalDpi xmlns:a14="http://schemas.microsoft.com/office/drawing/2010/main" val="0"/>
+              </a:ext>
+              <a:ext uri="{96DAC541-7B7A-43D3-8B79-37D633B846F1}">
+                <asvg:svgBlip xmlns:asvg="http://schemas.microsoft.com/office/drawing/2016/SVG/main" r:embed="rId17"/>
+              </a:ext>
+            </a:extLst>
+          </a:blip>
+          <a:stretch>
+            <a:fillRect/>
+          </a:stretch>
+        </p:blipFill>
+        <p:spPr>
+          <a:xfrm>
+            <a:off x="8220296" y="4242732"/>
+            <a:ext cx="846792" cy="846792"/>
+          </a:xfrm>
+          <a:prstGeom prst="rect">
+            <a:avLst/>
+          </a:prstGeom>
+        </p:spPr>
+      </p:pic>
+      <p:pic>
+        <p:nvPicPr>
+          <p:cNvPr id="13" name="Graphic 12" descr="Questions with solid fill">
+            <a:extLst>
+              <a:ext uri="{FF2B5EF4-FFF2-40B4-BE49-F238E27FC236}">
+                <a16:creationId xmlns:a16="http://schemas.microsoft.com/office/drawing/2014/main" id="{F46DEFAA-8B90-4220-7474-6D96FA10D118}"/>
+              </a:ext>
+            </a:extLst>
+          </p:cNvPr>
+          <p:cNvPicPr>
+            <a:picLocks noChangeAspect="1"/>
+          </p:cNvPicPr>
+          <p:nvPr/>
+        </p:nvPicPr>
+        <p:blipFill>
+          <a:blip r:embed="rId18">
+            <a:extLst>
+              <a:ext uri="{28A0092B-C50C-407E-A947-70E740481C1C}">
+                <a14:useLocalDpi xmlns:a14="http://schemas.microsoft.com/office/drawing/2010/main" val="0"/>
+              </a:ext>
+              <a:ext uri="{96DAC541-7B7A-43D3-8B79-37D633B846F1}">
+                <asvg:svgBlip xmlns:asvg="http://schemas.microsoft.com/office/drawing/2016/SVG/main" r:embed="rId19"/>
+              </a:ext>
+            </a:extLst>
+          </a:blip>
+          <a:stretch>
+            <a:fillRect/>
+          </a:stretch>
+        </p:blipFill>
+        <p:spPr>
+          <a:xfrm>
+            <a:off x="9573689" y="4164153"/>
+            <a:ext cx="914400" cy="914400"/>
+          </a:xfrm>
+          <a:prstGeom prst="rect">
+            <a:avLst/>
+          </a:prstGeom>
+        </p:spPr>
+      </p:pic>
+      <p:pic>
+        <p:nvPicPr>
+          <p:cNvPr id="15" name="Graphic 14" descr="Web design outline">
+            <a:extLst>
+              <a:ext uri="{FF2B5EF4-FFF2-40B4-BE49-F238E27FC236}">
+                <a16:creationId xmlns:a16="http://schemas.microsoft.com/office/drawing/2014/main" id="{1EF1B380-39C1-7066-72E9-0A74EE7B72CF}"/>
+              </a:ext>
+            </a:extLst>
+          </p:cNvPr>
+          <p:cNvPicPr>
+            <a:picLocks noChangeAspect="1"/>
+          </p:cNvPicPr>
+          <p:nvPr/>
+        </p:nvPicPr>
+        <p:blipFill>
+          <a:blip r:embed="rId20">
+            <a:extLst>
+              <a:ext uri="{28A0092B-C50C-407E-A947-70E740481C1C}">
+                <a14:useLocalDpi xmlns:a14="http://schemas.microsoft.com/office/drawing/2010/main" val="0"/>
+              </a:ext>
+              <a:ext uri="{96DAC541-7B7A-43D3-8B79-37D633B846F1}">
+                <asvg:svgBlip xmlns:asvg="http://schemas.microsoft.com/office/drawing/2016/SVG/main" r:embed="rId21"/>
+              </a:ext>
+            </a:extLst>
+          </a:blip>
+          <a:stretch>
+            <a:fillRect/>
+          </a:stretch>
+        </p:blipFill>
+        <p:spPr>
+          <a:xfrm>
+            <a:off x="9044602" y="660237"/>
+            <a:ext cx="914400" cy="914400"/>
+          </a:xfrm>
+          <a:prstGeom prst="rect">
+            <a:avLst/>
+          </a:prstGeom>
+        </p:spPr>
+      </p:pic>
+      <p:pic>
+        <p:nvPicPr>
+          <p:cNvPr id="16" name="Graphic 15" descr="Owl with solid fill">
+            <a:extLst>
+              <a:ext uri="{FF2B5EF4-FFF2-40B4-BE49-F238E27FC236}">
+                <a16:creationId xmlns:a16="http://schemas.microsoft.com/office/drawing/2014/main" id="{6DBA398C-E925-A74F-3684-8CAD8CF2A4C7}"/>
+              </a:ext>
+            </a:extLst>
+          </p:cNvPr>
+          <p:cNvPicPr>
+            <a:picLocks noChangeAspect="1"/>
+          </p:cNvPicPr>
+          <p:nvPr/>
+        </p:nvPicPr>
+        <p:blipFill>
+          <a:blip r:embed="rId8">
+            <a:extLst>
+              <a:ext uri="{28A0092B-C50C-407E-A947-70E740481C1C}">
+                <a14:useLocalDpi xmlns:a14="http://schemas.microsoft.com/office/drawing/2010/main" val="0"/>
+              </a:ext>
+              <a:ext uri="{96DAC541-7B7A-43D3-8B79-37D633B846F1}">
+                <asvg:svgBlip xmlns:asvg="http://schemas.microsoft.com/office/drawing/2016/SVG/main" r:embed="rId9"/>
+              </a:ext>
+            </a:extLst>
+          </a:blip>
+          <a:stretch>
+            <a:fillRect/>
+          </a:stretch>
+        </p:blipFill>
+        <p:spPr>
+          <a:xfrm>
+            <a:off x="2210512" y="3706953"/>
+            <a:ext cx="914400" cy="914400"/>
+          </a:xfrm>
+          <a:prstGeom prst="rect">
+            <a:avLst/>
+          </a:prstGeom>
+        </p:spPr>
+      </p:pic>
+      <p:pic>
+        <p:nvPicPr>
+          <p:cNvPr id="26" name="Picture 25">
+            <a:extLst>
+              <a:ext uri="{FF2B5EF4-FFF2-40B4-BE49-F238E27FC236}">
+                <a16:creationId xmlns:a16="http://schemas.microsoft.com/office/drawing/2014/main" id="{042CD3D3-67DB-C8B8-0EE5-C17FB0DC7EA8}"/>
+              </a:ext>
+            </a:extLst>
+          </p:cNvPr>
+          <p:cNvPicPr>
+            <a:picLocks noChangeAspect="1"/>
+          </p:cNvPicPr>
+          <p:nvPr/>
+        </p:nvPicPr>
+        <p:blipFill>
+          <a:blip r:embed="rId22"/>
+          <a:stretch>
+            <a:fillRect/>
+          </a:stretch>
+        </p:blipFill>
+        <p:spPr>
+          <a:xfrm>
+            <a:off x="2551636" y="3871387"/>
+            <a:ext cx="91552" cy="102919"/>
+          </a:xfrm>
+          <a:prstGeom prst="rect">
+            <a:avLst/>
+          </a:prstGeom>
+        </p:spPr>
+      </p:pic>
+      <p:pic>
+        <p:nvPicPr>
+          <p:cNvPr id="27" name="Picture 26">
+            <a:extLst>
+              <a:ext uri="{FF2B5EF4-FFF2-40B4-BE49-F238E27FC236}">
+                <a16:creationId xmlns:a16="http://schemas.microsoft.com/office/drawing/2014/main" id="{0C54C48B-F41B-DC8A-5EFA-4618A0A684A1}"/>
+              </a:ext>
+            </a:extLst>
+          </p:cNvPr>
+          <p:cNvPicPr>
+            <a:picLocks noChangeAspect="1"/>
+          </p:cNvPicPr>
+          <p:nvPr/>
+        </p:nvPicPr>
+        <p:blipFill>
+          <a:blip r:embed="rId22"/>
+          <a:stretch>
+            <a:fillRect/>
+          </a:stretch>
+        </p:blipFill>
+        <p:spPr>
+          <a:xfrm>
+            <a:off x="2685446" y="3876149"/>
+            <a:ext cx="91552" cy="102919"/>
           </a:xfrm>
           <a:prstGeom prst="rect">
             <a:avLst/>

</xml_diff>

<commit_message>
Add 9 array operation challenges
</commit_message>
<xml_diff>
--- a/docs/hackyOWL.pptx
+++ b/docs/hackyOWL.pptx
@@ -259,7 +259,7 @@
           <a:p>
             <a:fld id="{F082AF23-E69D-451E-BD7B-3525F6B6708C}" type="datetimeFigureOut">
               <a:rPr lang="en-US" smtClean="0"/>
-              <a:t>3/9/2023</a:t>
+              <a:t>3/11/2023</a:t>
             </a:fld>
             <a:endParaRPr lang="en-US"/>
           </a:p>
@@ -457,7 +457,7 @@
           <a:p>
             <a:fld id="{F082AF23-E69D-451E-BD7B-3525F6B6708C}" type="datetimeFigureOut">
               <a:rPr lang="en-US" smtClean="0"/>
-              <a:t>3/9/2023</a:t>
+              <a:t>3/11/2023</a:t>
             </a:fld>
             <a:endParaRPr lang="en-US"/>
           </a:p>
@@ -665,7 +665,7 @@
           <a:p>
             <a:fld id="{F082AF23-E69D-451E-BD7B-3525F6B6708C}" type="datetimeFigureOut">
               <a:rPr lang="en-US" smtClean="0"/>
-              <a:t>3/9/2023</a:t>
+              <a:t>3/11/2023</a:t>
             </a:fld>
             <a:endParaRPr lang="en-US"/>
           </a:p>
@@ -863,7 +863,7 @@
           <a:p>
             <a:fld id="{F082AF23-E69D-451E-BD7B-3525F6B6708C}" type="datetimeFigureOut">
               <a:rPr lang="en-US" smtClean="0"/>
-              <a:t>3/9/2023</a:t>
+              <a:t>3/11/2023</a:t>
             </a:fld>
             <a:endParaRPr lang="en-US"/>
           </a:p>
@@ -1138,7 +1138,7 @@
           <a:p>
             <a:fld id="{F082AF23-E69D-451E-BD7B-3525F6B6708C}" type="datetimeFigureOut">
               <a:rPr lang="en-US" smtClean="0"/>
-              <a:t>3/9/2023</a:t>
+              <a:t>3/11/2023</a:t>
             </a:fld>
             <a:endParaRPr lang="en-US"/>
           </a:p>
@@ -1403,7 +1403,7 @@
           <a:p>
             <a:fld id="{F082AF23-E69D-451E-BD7B-3525F6B6708C}" type="datetimeFigureOut">
               <a:rPr lang="en-US" smtClean="0"/>
-              <a:t>3/9/2023</a:t>
+              <a:t>3/11/2023</a:t>
             </a:fld>
             <a:endParaRPr lang="en-US"/>
           </a:p>
@@ -1815,7 +1815,7 @@
           <a:p>
             <a:fld id="{F082AF23-E69D-451E-BD7B-3525F6B6708C}" type="datetimeFigureOut">
               <a:rPr lang="en-US" smtClean="0"/>
-              <a:t>3/9/2023</a:t>
+              <a:t>3/11/2023</a:t>
             </a:fld>
             <a:endParaRPr lang="en-US"/>
           </a:p>
@@ -1956,7 +1956,7 @@
           <a:p>
             <a:fld id="{F082AF23-E69D-451E-BD7B-3525F6B6708C}" type="datetimeFigureOut">
               <a:rPr lang="en-US" smtClean="0"/>
-              <a:t>3/9/2023</a:t>
+              <a:t>3/11/2023</a:t>
             </a:fld>
             <a:endParaRPr lang="en-US"/>
           </a:p>
@@ -2069,7 +2069,7 @@
           <a:p>
             <a:fld id="{F082AF23-E69D-451E-BD7B-3525F6B6708C}" type="datetimeFigureOut">
               <a:rPr lang="en-US" smtClean="0"/>
-              <a:t>3/9/2023</a:t>
+              <a:t>3/11/2023</a:t>
             </a:fld>
             <a:endParaRPr lang="en-US"/>
           </a:p>
@@ -2380,7 +2380,7 @@
           <a:p>
             <a:fld id="{F082AF23-E69D-451E-BD7B-3525F6B6708C}" type="datetimeFigureOut">
               <a:rPr lang="en-US" smtClean="0"/>
-              <a:t>3/9/2023</a:t>
+              <a:t>3/11/2023</a:t>
             </a:fld>
             <a:endParaRPr lang="en-US"/>
           </a:p>
@@ -2668,7 +2668,7 @@
           <a:p>
             <a:fld id="{F082AF23-E69D-451E-BD7B-3525F6B6708C}" type="datetimeFigureOut">
               <a:rPr lang="en-US" smtClean="0"/>
-              <a:t>3/9/2023</a:t>
+              <a:t>3/11/2023</a:t>
             </a:fld>
             <a:endParaRPr lang="en-US"/>
           </a:p>
@@ -2909,7 +2909,7 @@
           <a:p>
             <a:fld id="{F082AF23-E69D-451E-BD7B-3525F6B6708C}" type="datetimeFigureOut">
               <a:rPr lang="en-US" smtClean="0"/>
-              <a:t>3/9/2023</a:t>
+              <a:t>3/11/2023</a:t>
             </a:fld>
             <a:endParaRPr lang="en-US"/>
           </a:p>
@@ -3815,6 +3815,88 @@
           </a:prstGeom>
         </p:spPr>
       </p:pic>
+      <p:sp>
+        <p:nvSpPr>
+          <p:cNvPr id="2" name="TextBox 1">
+            <a:extLst>
+              <a:ext uri="{FF2B5EF4-FFF2-40B4-BE49-F238E27FC236}">
+                <a16:creationId xmlns:a16="http://schemas.microsoft.com/office/drawing/2014/main" id="{5D8C856D-3F10-8B9E-08C9-1ACA006A1928}"/>
+              </a:ext>
+            </a:extLst>
+          </p:cNvPr>
+          <p:cNvSpPr txBox="1"/>
+          <p:nvPr/>
+        </p:nvSpPr>
+        <p:spPr>
+          <a:xfrm>
+            <a:off x="1095868" y="846034"/>
+            <a:ext cx="412292" cy="584775"/>
+          </a:xfrm>
+          <a:prstGeom prst="rect">
+            <a:avLst/>
+          </a:prstGeom>
+          <a:noFill/>
+        </p:spPr>
+        <p:txBody>
+          <a:bodyPr wrap="none" rtlCol="0">
+            <a:spAutoFit/>
+          </a:bodyPr>
+          <a:lstStyle/>
+          <a:p>
+            <a:r>
+              <a:rPr lang="en-US" sz="3200" b="1" dirty="0">
+                <a:solidFill>
+                  <a:srgbClr val="8BC34A"/>
+                </a:solidFill>
+                <a:latin typeface="Amasis MT Pro" panose="020B0604020202020204" pitchFamily="18" charset="0"/>
+                <a:cs typeface="Aldhabi" panose="020B0604020202020204" pitchFamily="2" charset="-78"/>
+              </a:rPr>
+              <a:t>0</a:t>
+            </a:r>
+          </a:p>
+        </p:txBody>
+      </p:sp>
+      <p:sp>
+        <p:nvSpPr>
+          <p:cNvPr id="9" name="TextBox 8">
+            <a:extLst>
+              <a:ext uri="{FF2B5EF4-FFF2-40B4-BE49-F238E27FC236}">
+                <a16:creationId xmlns:a16="http://schemas.microsoft.com/office/drawing/2014/main" id="{1A4945A2-4C5A-9EDB-BABE-4B27737366EB}"/>
+              </a:ext>
+            </a:extLst>
+          </p:cNvPr>
+          <p:cNvSpPr txBox="1"/>
+          <p:nvPr/>
+        </p:nvSpPr>
+        <p:spPr>
+          <a:xfrm>
+            <a:off x="1748819" y="846034"/>
+            <a:ext cx="412292" cy="584775"/>
+          </a:xfrm>
+          <a:prstGeom prst="rect">
+            <a:avLst/>
+          </a:prstGeom>
+          <a:noFill/>
+        </p:spPr>
+        <p:txBody>
+          <a:bodyPr wrap="none" rtlCol="0">
+            <a:spAutoFit/>
+          </a:bodyPr>
+          <a:lstStyle/>
+          <a:p>
+            <a:r>
+              <a:rPr lang="en-US" sz="3200" b="1" dirty="0">
+                <a:solidFill>
+                  <a:srgbClr val="FAFAFA"/>
+                </a:solidFill>
+                <a:latin typeface="Amasis MT Pro" panose="020B0604020202020204" pitchFamily="18" charset="0"/>
+                <a:cs typeface="Aldhabi" panose="020B0604020202020204" pitchFamily="2" charset="-78"/>
+              </a:rPr>
+              <a:t>0</a:t>
+            </a:r>
+          </a:p>
+        </p:txBody>
+      </p:sp>
     </p:spTree>
     <p:extLst>
       <p:ext uri="{BB962C8B-B14F-4D97-AF65-F5344CB8AC3E}">

</xml_diff>